<commit_message>
briefly described program and version control
</commit_message>
<xml_diff>
--- a/Presentation.pptx
+++ b/Presentation.pptx
@@ -7,8 +7,11 @@
   <p:sldIdLst>
     <p:sldId id="256" r:id="rId2"/>
     <p:sldId id="257" r:id="rId3"/>
-    <p:sldId id="258" r:id="rId4"/>
-    <p:sldId id="259" r:id="rId5"/>
+    <p:sldId id="260" r:id="rId4"/>
+    <p:sldId id="261" r:id="rId5"/>
+    <p:sldId id="262" r:id="rId6"/>
+    <p:sldId id="258" r:id="rId7"/>
+    <p:sldId id="259" r:id="rId8"/>
   </p:sldIdLst>
   <p:sldSz cx="12192000" cy="6858000"/>
   <p:notesSz cx="6858000" cy="9144000"/>
@@ -107,7 +110,65 @@
       </a:defRPr>
     </a:lvl9pPr>
   </p:defaultTextStyle>
+  <p:extLst>
+    <p:ext uri="{EFAFB233-063F-42B5-8137-9DF3F51BA10A}">
+      <p15:sldGuideLst xmlns:p15="http://schemas.microsoft.com/office/powerpoint/2012/main"/>
+    </p:ext>
+  </p:extLst>
 </p:presentation>
+</file>
+
+<file path=ppt/revisionInfo.xml><?xml version="1.0" encoding="utf-8"?>
+<p1510:revInfo xmlns:a="http://schemas.openxmlformats.org/drawingml/2006/main" xmlns:r="http://schemas.openxmlformats.org/officeDocument/2006/relationships" xmlns:p1510="http://schemas.microsoft.com/office/powerpoint/2015/10/main">
+  <p1510:revLst>
+    <p1510:client id="{478B6739-5DBF-4359-8363-986FF50D1826}" v="3" dt="2020-02-18T19:49:13.718"/>
+  </p1510:revLst>
+</p1510:revInfo>
+</file>
+
+<file path=ppt/changesInfos/changesInfo1.xml><?xml version="1.0" encoding="utf-8"?>
+<pc:chgInfo xmlns:a="http://schemas.openxmlformats.org/drawingml/2006/main" xmlns:r="http://schemas.openxmlformats.org/officeDocument/2006/relationships" xmlns:ac="http://schemas.microsoft.com/office/drawing/2013/main/command" xmlns:pc="http://schemas.microsoft.com/office/powerpoint/2013/main/command">
+  <pc:docChgLst>
+    <pc:chgData name="Zak Hargreaves" userId="ee398d0d-6b79-42a5-af56-4f5e1907b4b9" providerId="ADAL" clId="{478B6739-5DBF-4359-8363-986FF50D1826}"/>
+    <pc:docChg chg="undo custSel modSld">
+      <pc:chgData name="Zak Hargreaves" userId="ee398d0d-6b79-42a5-af56-4f5e1907b4b9" providerId="ADAL" clId="{478B6739-5DBF-4359-8363-986FF50D1826}" dt="2020-02-18T19:49:32.555" v="19" actId="1076"/>
+      <pc:docMkLst>
+        <pc:docMk/>
+      </pc:docMkLst>
+      <pc:sldChg chg="addSp delSp modSp">
+        <pc:chgData name="Zak Hargreaves" userId="ee398d0d-6b79-42a5-af56-4f5e1907b4b9" providerId="ADAL" clId="{478B6739-5DBF-4359-8363-986FF50D1826}" dt="2020-02-18T19:49:32.555" v="19" actId="1076"/>
+        <pc:sldMkLst>
+          <pc:docMk/>
+          <pc:sldMk cId="2422808282" sldId="257"/>
+        </pc:sldMkLst>
+        <pc:spChg chg="del">
+          <ac:chgData name="Zak Hargreaves" userId="ee398d0d-6b79-42a5-af56-4f5e1907b4b9" providerId="ADAL" clId="{478B6739-5DBF-4359-8363-986FF50D1826}" dt="2020-02-18T19:48:23.623" v="0"/>
+          <ac:spMkLst>
+            <pc:docMk/>
+            <pc:sldMk cId="2422808282" sldId="257"/>
+            <ac:spMk id="3" creationId="{27FED1E5-410B-4D11-9DC5-C491B4400AAB}"/>
+          </ac:spMkLst>
+        </pc:spChg>
+        <pc:spChg chg="add del mod">
+          <ac:chgData name="Zak Hargreaves" userId="ee398d0d-6b79-42a5-af56-4f5e1907b4b9" providerId="ADAL" clId="{478B6739-5DBF-4359-8363-986FF50D1826}" dt="2020-02-18T19:49:08.537" v="11" actId="478"/>
+          <ac:spMkLst>
+            <pc:docMk/>
+            <pc:sldMk cId="2422808282" sldId="257"/>
+            <ac:spMk id="6" creationId="{ADF0D42B-F891-4B31-8F60-5B344F5DC6AE}"/>
+          </ac:spMkLst>
+        </pc:spChg>
+        <pc:picChg chg="add del mod modCrop">
+          <ac:chgData name="Zak Hargreaves" userId="ee398d0d-6b79-42a5-af56-4f5e1907b4b9" providerId="ADAL" clId="{478B6739-5DBF-4359-8363-986FF50D1826}" dt="2020-02-18T19:49:32.555" v="19" actId="1076"/>
+          <ac:picMkLst>
+            <pc:docMk/>
+            <pc:sldMk cId="2422808282" sldId="257"/>
+            <ac:picMk id="4" creationId="{ED8165F4-391B-46E4-B719-3996610BC867}"/>
+          </ac:picMkLst>
+        </pc:picChg>
+      </pc:sldChg>
+    </pc:docChg>
+  </pc:docChgLst>
+</pc:chgInfo>
 </file>
 
 <file path=ppt/slideLayouts/slideLayout1.xml><?xml version="1.0" encoding="utf-8"?>
@@ -2895,10 +2956,9 @@
           </a:lstStyle>
           <a:p>
             <a:r>
-              <a:rPr lang="en-US"/>
+              <a:rPr lang="en-US" dirty="0"/>
               <a:t>Click icon to add picture</a:t>
             </a:r>
-            <a:endParaRPr lang="en-US" dirty="0"/>
           </a:p>
         </p:txBody>
       </p:sp>
@@ -3897,7 +3957,7 @@
           <a:lstStyle/>
           <a:p>
             <a:pPr algn="ctr"/>
-            <a:endParaRPr lang="en-US"/>
+            <a:endParaRPr lang="en-US" dirty="0"/>
           </a:p>
         </p:txBody>
       </p:sp>
@@ -4005,7 +4065,7 @@
                   <a:schemeClr val="tx1"/>
                 </a:solidFill>
               </a:rPr>
-              <a:t>Zak, Jacob &amp; Lewis</a:t>
+              <a:t>Zak Hargreaves, Jacob Marshall &amp; Lewis Robinson</a:t>
             </a:r>
           </a:p>
         </p:txBody>
@@ -4026,6 +4086,14 @@
 <file path=ppt/slides/slide2.xml><?xml version="1.0" encoding="utf-8"?>
 <p:sld xmlns:a="http://schemas.openxmlformats.org/drawingml/2006/main" xmlns:r="http://schemas.openxmlformats.org/officeDocument/2006/relationships" xmlns:p="http://schemas.openxmlformats.org/presentationml/2006/main">
   <p:cSld>
+    <p:bg>
+      <p:bgPr>
+        <a:solidFill>
+          <a:schemeClr val="bg1"/>
+        </a:solidFill>
+        <a:effectLst/>
+      </p:bgPr>
+    </p:bg>
     <p:spTree>
       <p:nvGrpSpPr>
         <p:cNvPr id="1" name=""/>
@@ -4042,6 +4110,63 @@
       </p:grpSpPr>
       <p:sp>
         <p:nvSpPr>
+          <p:cNvPr id="11" name="Rectangle 10">
+            <a:extLst>
+              <a:ext uri="{FF2B5EF4-FFF2-40B4-BE49-F238E27FC236}">
+                <a16:creationId xmlns:a16="http://schemas.microsoft.com/office/drawing/2014/main" id="{3CED7894-4F62-4A6C-8DB5-DB5BE08E9C03}"/>
+              </a:ext>
+              <a:ext uri="{C183D7F6-B498-43B3-948B-1728B52AA6E4}">
+                <adec:decorative xmlns:adec="http://schemas.microsoft.com/office/drawing/2017/decorative" val="1"/>
+              </a:ext>
+            </a:extLst>
+          </p:cNvPr>
+          <p:cNvSpPr>
+            <a:spLocks noGrp="1" noRot="1" noChangeAspect="1" noMove="1" noResize="1" noEditPoints="1" noAdjustHandles="1" noChangeArrowheads="1" noChangeShapeType="1" noTextEdit="1"/>
+          </p:cNvSpPr>
+          <p:nvPr>
+            <p:extLst>
+              <p:ext uri="{386F3935-93C4-4BCD-93E2-E3B085C9AB24}">
+                <p16:designElem xmlns:p16="http://schemas.microsoft.com/office/powerpoint/2015/main" val="1"/>
+              </p:ext>
+            </p:extLst>
+          </p:nvPr>
+        </p:nvSpPr>
+        <p:spPr>
+          <a:xfrm>
+            <a:off x="0" y="0"/>
+            <a:ext cx="12192000" cy="6858000"/>
+          </a:xfrm>
+          <a:prstGeom prst="rect">
+            <a:avLst/>
+          </a:prstGeom>
+          <a:solidFill>
+            <a:schemeClr val="bg1">
+              <a:lumMod val="75000"/>
+              <a:lumOff val="25000"/>
+            </a:schemeClr>
+          </a:solidFill>
+          <a:ln>
+            <a:noFill/>
+          </a:ln>
+          <a:effectLst/>
+        </p:spPr>
+        <p:style>
+          <a:lnRef idx="1">
+            <a:schemeClr val="accent1"/>
+          </a:lnRef>
+          <a:fillRef idx="3">
+            <a:schemeClr val="accent1"/>
+          </a:fillRef>
+          <a:effectRef idx="2">
+            <a:schemeClr val="accent1"/>
+          </a:effectRef>
+          <a:fontRef idx="minor">
+            <a:schemeClr val="lt1"/>
+          </a:fontRef>
+        </p:style>
+      </p:sp>
+      <p:sp>
+        <p:nvSpPr>
           <p:cNvPr id="2" name="Title 1">
             <a:extLst>
               <a:ext uri="{FF2B5EF4-FFF2-40B4-BE49-F238E27FC236}">
@@ -4056,9 +4181,16 @@
             <p:ph type="title"/>
           </p:nvPr>
         </p:nvSpPr>
-        <p:spPr/>
-        <p:txBody>
-          <a:bodyPr/>
+        <p:spPr>
+          <a:xfrm>
+            <a:off x="609906" y="702155"/>
+            <a:ext cx="3568661" cy="1269713"/>
+          </a:xfrm>
+        </p:spPr>
+        <p:txBody>
+          <a:bodyPr>
+            <a:normAutofit/>
+          </a:bodyPr>
           <a:lstStyle/>
           <a:p>
             <a:r>
@@ -4070,29 +4202,134 @@
       </p:sp>
       <p:sp>
         <p:nvSpPr>
-          <p:cNvPr id="3" name="Content Placeholder 2">
+          <p:cNvPr id="13" name="Rectangle 12">
             <a:extLst>
               <a:ext uri="{FF2B5EF4-FFF2-40B4-BE49-F238E27FC236}">
-                <a16:creationId xmlns:a16="http://schemas.microsoft.com/office/drawing/2014/main" id="{27FED1E5-410B-4D11-9DC5-C491B4400AAB}"/>
+                <a16:creationId xmlns:a16="http://schemas.microsoft.com/office/drawing/2014/main" id="{E536F3B4-50F6-4C52-8F76-4EB1214719DC}"/>
+              </a:ext>
+              <a:ext uri="{C183D7F6-B498-43B3-948B-1728B52AA6E4}">
+                <adec:decorative xmlns:adec="http://schemas.microsoft.com/office/drawing/2017/decorative" val="1"/>
               </a:ext>
             </a:extLst>
           </p:cNvPr>
           <p:cNvSpPr>
+            <a:spLocks noGrp="1" noRot="1" noChangeAspect="1" noMove="1" noResize="1" noEditPoints="1" noAdjustHandles="1" noChangeArrowheads="1" noChangeShapeType="1" noTextEdit="1"/>
+          </p:cNvSpPr>
+          <p:nvPr>
+            <p:extLst>
+              <p:ext uri="{386F3935-93C4-4BCD-93E2-E3B085C9AB24}">
+                <p16:designElem xmlns:p16="http://schemas.microsoft.com/office/powerpoint/2015/main" val="1"/>
+              </p:ext>
+            </p:extLst>
+          </p:nvPr>
+        </p:nvSpPr>
+        <p:spPr>
+          <a:xfrm>
+            <a:off x="638620" y="457200"/>
+            <a:ext cx="3511233" cy="91439"/>
+          </a:xfrm>
+          <a:prstGeom prst="rect">
+            <a:avLst/>
+          </a:prstGeom>
+          <a:solidFill>
+            <a:schemeClr val="accent1"/>
+          </a:solidFill>
+          <a:ln>
+            <a:noFill/>
+          </a:ln>
+          <a:effectLst/>
+        </p:spPr>
+        <p:style>
+          <a:lnRef idx="1">
+            <a:schemeClr val="accent1"/>
+          </a:lnRef>
+          <a:fillRef idx="3">
+            <a:schemeClr val="accent1"/>
+          </a:fillRef>
+          <a:effectRef idx="2">
+            <a:schemeClr val="accent1"/>
+          </a:effectRef>
+          <a:fontRef idx="minor">
+            <a:schemeClr val="lt1"/>
+          </a:fontRef>
+        </p:style>
+      </p:sp>
+      <p:sp>
+        <p:nvSpPr>
+          <p:cNvPr id="8" name="Content Placeholder 7">
+            <a:extLst>
+              <a:ext uri="{FF2B5EF4-FFF2-40B4-BE49-F238E27FC236}">
+                <a16:creationId xmlns:a16="http://schemas.microsoft.com/office/drawing/2014/main" id="{0A696875-0A4F-4B74-81CA-BE57ED01A4FA}"/>
+              </a:ext>
+            </a:extLst>
+          </p:cNvPr>
+          <p:cNvSpPr>
             <a:spLocks noGrp="1"/>
           </p:cNvSpPr>
           <p:nvPr>
             <p:ph idx="1"/>
           </p:nvPr>
         </p:nvSpPr>
-        <p:spPr/>
-        <p:txBody>
-          <a:bodyPr/>
+        <p:spPr>
+          <a:xfrm>
+            <a:off x="609906" y="1250794"/>
+            <a:ext cx="5019107" cy="3849966"/>
+          </a:xfrm>
+        </p:spPr>
+        <p:txBody>
+          <a:bodyPr>
+            <a:normAutofit/>
+          </a:bodyPr>
           <a:lstStyle/>
           <a:p>
-            <a:endParaRPr lang="en-GB" dirty="0"/>
-          </a:p>
-        </p:txBody>
-      </p:sp>
+            <a:pPr marL="0" indent="0">
+              <a:buNone/>
+            </a:pPr>
+            <a:r>
+              <a:rPr lang="en-US" dirty="0"/>
+              <a:t>Every time the code was changed the records were updated and commented with what the change was. This allowed us to revert back to selected files incase of any errors (EG: File Corruption) This type of version control is called a Distributed Version Control System (DVS)</a:t>
+            </a:r>
+          </a:p>
+          <a:p>
+            <a:pPr marL="0" indent="0">
+              <a:buNone/>
+            </a:pPr>
+            <a:r>
+              <a:rPr lang="en-US" dirty="0"/>
+              <a:t> </a:t>
+            </a:r>
+          </a:p>
+        </p:txBody>
+      </p:sp>
+      <p:pic>
+        <p:nvPicPr>
+          <p:cNvPr id="4" name="Content Placeholder 3">
+            <a:extLst>
+              <a:ext uri="{FF2B5EF4-FFF2-40B4-BE49-F238E27FC236}">
+                <a16:creationId xmlns:a16="http://schemas.microsoft.com/office/drawing/2014/main" id="{ED8165F4-391B-46E4-B719-3996610BC867}"/>
+              </a:ext>
+            </a:extLst>
+          </p:cNvPr>
+          <p:cNvPicPr>
+            <a:picLocks noChangeAspect="1"/>
+          </p:cNvPicPr>
+          <p:nvPr/>
+        </p:nvPicPr>
+        <p:blipFill rotWithShape="1">
+          <a:blip r:embed="rId2"/>
+          <a:srcRect l="11848" t="6607" r="60924" b="8818"/>
+          <a:stretch/>
+        </p:blipFill>
+        <p:spPr>
+          <a:xfrm>
+            <a:off x="5856786" y="406125"/>
+            <a:ext cx="5949017" cy="5220233"/>
+          </a:xfrm>
+          <a:prstGeom prst="rect">
+            <a:avLst/>
+          </a:prstGeom>
+        </p:spPr>
+      </p:pic>
     </p:spTree>
     <p:extLst>
       <p:ext uri="{BB962C8B-B14F-4D97-AF65-F5344CB8AC3E}">
@@ -4109,6 +4346,14 @@
 <file path=ppt/slides/slide3.xml><?xml version="1.0" encoding="utf-8"?>
 <p:sld xmlns:a="http://schemas.openxmlformats.org/drawingml/2006/main" xmlns:r="http://schemas.openxmlformats.org/officeDocument/2006/relationships" xmlns:p="http://schemas.openxmlformats.org/presentationml/2006/main">
   <p:cSld>
+    <p:bg>
+      <p:bgPr>
+        <a:solidFill>
+          <a:schemeClr val="bg1"/>
+        </a:solidFill>
+        <a:effectLst/>
+      </p:bgPr>
+    </p:bg>
     <p:spTree>
       <p:nvGrpSpPr>
         <p:cNvPr id="1" name=""/>
@@ -4125,6 +4370,1409 @@
       </p:grpSpPr>
       <p:sp>
         <p:nvSpPr>
+          <p:cNvPr id="11" name="Rectangle 10">
+            <a:extLst>
+              <a:ext uri="{FF2B5EF4-FFF2-40B4-BE49-F238E27FC236}">
+                <a16:creationId xmlns:a16="http://schemas.microsoft.com/office/drawing/2014/main" id="{3CED7894-4F62-4A6C-8DB5-DB5BE08E9C03}"/>
+              </a:ext>
+              <a:ext uri="{C183D7F6-B498-43B3-948B-1728B52AA6E4}">
+                <adec:decorative xmlns:adec="http://schemas.microsoft.com/office/drawing/2017/decorative" val="1"/>
+              </a:ext>
+            </a:extLst>
+          </p:cNvPr>
+          <p:cNvSpPr>
+            <a:spLocks noGrp="1" noRot="1" noChangeAspect="1" noMove="1" noResize="1" noEditPoints="1" noAdjustHandles="1" noChangeArrowheads="1" noChangeShapeType="1" noTextEdit="1"/>
+          </p:cNvSpPr>
+          <p:nvPr>
+            <p:extLst>
+              <p:ext uri="{386F3935-93C4-4BCD-93E2-E3B085C9AB24}">
+                <p16:designElem xmlns:p16="http://schemas.microsoft.com/office/powerpoint/2015/main" val="1"/>
+              </p:ext>
+            </p:extLst>
+          </p:nvPr>
+        </p:nvSpPr>
+        <p:spPr>
+          <a:xfrm>
+            <a:off x="0" y="0"/>
+            <a:ext cx="12192000" cy="6858000"/>
+          </a:xfrm>
+          <a:prstGeom prst="rect">
+            <a:avLst/>
+          </a:prstGeom>
+          <a:solidFill>
+            <a:schemeClr val="bg1">
+              <a:lumMod val="75000"/>
+              <a:lumOff val="25000"/>
+            </a:schemeClr>
+          </a:solidFill>
+          <a:ln>
+            <a:noFill/>
+          </a:ln>
+          <a:effectLst/>
+        </p:spPr>
+        <p:style>
+          <a:lnRef idx="1">
+            <a:schemeClr val="accent1"/>
+          </a:lnRef>
+          <a:fillRef idx="3">
+            <a:schemeClr val="accent1"/>
+          </a:fillRef>
+          <a:effectRef idx="2">
+            <a:schemeClr val="accent1"/>
+          </a:effectRef>
+          <a:fontRef idx="minor">
+            <a:schemeClr val="lt1"/>
+          </a:fontRef>
+        </p:style>
+      </p:sp>
+      <p:sp>
+        <p:nvSpPr>
+          <p:cNvPr id="13" name="Rectangle 12">
+            <a:extLst>
+              <a:ext uri="{FF2B5EF4-FFF2-40B4-BE49-F238E27FC236}">
+                <a16:creationId xmlns:a16="http://schemas.microsoft.com/office/drawing/2014/main" id="{E536F3B4-50F6-4C52-8F76-4EB1214719DC}"/>
+              </a:ext>
+              <a:ext uri="{C183D7F6-B498-43B3-948B-1728B52AA6E4}">
+                <adec:decorative xmlns:adec="http://schemas.microsoft.com/office/drawing/2017/decorative" val="1"/>
+              </a:ext>
+            </a:extLst>
+          </p:cNvPr>
+          <p:cNvSpPr>
+            <a:spLocks noGrp="1" noRot="1" noChangeAspect="1" noMove="1" noResize="1" noEditPoints="1" noAdjustHandles="1" noChangeArrowheads="1" noChangeShapeType="1" noTextEdit="1"/>
+          </p:cNvSpPr>
+          <p:nvPr>
+            <p:extLst>
+              <p:ext uri="{386F3935-93C4-4BCD-93E2-E3B085C9AB24}">
+                <p16:designElem xmlns:p16="http://schemas.microsoft.com/office/powerpoint/2015/main" val="1"/>
+              </p:ext>
+            </p:extLst>
+          </p:nvPr>
+        </p:nvSpPr>
+        <p:spPr>
+          <a:xfrm>
+            <a:off x="638620" y="457200"/>
+            <a:ext cx="3511233" cy="91439"/>
+          </a:xfrm>
+          <a:prstGeom prst="rect">
+            <a:avLst/>
+          </a:prstGeom>
+          <a:solidFill>
+            <a:schemeClr val="accent1"/>
+          </a:solidFill>
+          <a:ln>
+            <a:noFill/>
+          </a:ln>
+          <a:effectLst/>
+        </p:spPr>
+        <p:style>
+          <a:lnRef idx="1">
+            <a:schemeClr val="accent1"/>
+          </a:lnRef>
+          <a:fillRef idx="3">
+            <a:schemeClr val="accent1"/>
+          </a:fillRef>
+          <a:effectRef idx="2">
+            <a:schemeClr val="accent1"/>
+          </a:effectRef>
+          <a:fontRef idx="minor">
+            <a:schemeClr val="lt1"/>
+          </a:fontRef>
+        </p:style>
+      </p:sp>
+      <p:sp>
+        <p:nvSpPr>
+          <p:cNvPr id="8" name="Content Placeholder 7">
+            <a:extLst>
+              <a:ext uri="{FF2B5EF4-FFF2-40B4-BE49-F238E27FC236}">
+                <a16:creationId xmlns:a16="http://schemas.microsoft.com/office/drawing/2014/main" id="{6686DB42-2EB9-4305-BD33-FDC54008264F}"/>
+              </a:ext>
+            </a:extLst>
+          </p:cNvPr>
+          <p:cNvSpPr>
+            <a:spLocks noGrp="1"/>
+          </p:cNvSpPr>
+          <p:nvPr>
+            <p:ph idx="1"/>
+          </p:nvPr>
+        </p:nvSpPr>
+        <p:spPr>
+          <a:xfrm>
+            <a:off x="609906" y="1005839"/>
+            <a:ext cx="4055400" cy="4969511"/>
+          </a:xfrm>
+        </p:spPr>
+        <p:txBody>
+          <a:bodyPr>
+            <a:normAutofit/>
+          </a:bodyPr>
+          <a:lstStyle/>
+          <a:p>
+            <a:r>
+              <a:rPr lang="en-US" dirty="0"/>
+              <a:t>When files were “pushed” to the remote repository the changes made in that commit were shown. This allowed everyone to see who updated the file and what was updated in the file.</a:t>
+            </a:r>
+          </a:p>
+          <a:p>
+            <a:r>
+              <a:rPr lang="en-US" dirty="0"/>
+              <a:t>Even the smallest of changes to the file were checked over to ensure the program would work successfully and the code is as </a:t>
+            </a:r>
+            <a:r>
+              <a:rPr lang="en-GB" dirty="0"/>
+              <a:t>optimised and efficient</a:t>
+            </a:r>
+            <a:r>
+              <a:rPr lang="en-US" dirty="0"/>
+              <a:t> as possible.</a:t>
+            </a:r>
+          </a:p>
+        </p:txBody>
+      </p:sp>
+      <p:pic>
+        <p:nvPicPr>
+          <p:cNvPr id="4" name="Content Placeholder 3">
+            <a:extLst>
+              <a:ext uri="{FF2B5EF4-FFF2-40B4-BE49-F238E27FC236}">
+                <a16:creationId xmlns:a16="http://schemas.microsoft.com/office/drawing/2014/main" id="{6B1BB3CF-4E94-4E6B-86C2-18BBDC97DB04}"/>
+              </a:ext>
+            </a:extLst>
+          </p:cNvPr>
+          <p:cNvPicPr>
+            <a:picLocks noChangeAspect="1"/>
+          </p:cNvPicPr>
+          <p:nvPr/>
+        </p:nvPicPr>
+        <p:blipFill rotWithShape="1">
+          <a:blip r:embed="rId2"/>
+          <a:srcRect l="11905" t="8970" r="62464" b="3805"/>
+          <a:stretch/>
+        </p:blipFill>
+        <p:spPr>
+          <a:xfrm>
+            <a:off x="5279411" y="702156"/>
+            <a:ext cx="5485041" cy="5273194"/>
+          </a:xfrm>
+          <a:prstGeom prst="rect">
+            <a:avLst/>
+          </a:prstGeom>
+        </p:spPr>
+      </p:pic>
+    </p:spTree>
+    <p:extLst>
+      <p:ext uri="{BB962C8B-B14F-4D97-AF65-F5344CB8AC3E}">
+        <p14:creationId xmlns:p14="http://schemas.microsoft.com/office/powerpoint/2010/main" val="218428478"/>
+      </p:ext>
+    </p:extLst>
+  </p:cSld>
+  <p:clrMapOvr>
+    <a:masterClrMapping/>
+  </p:clrMapOvr>
+</p:sld>
+</file>
+
+<file path=ppt/slides/slide4.xml><?xml version="1.0" encoding="utf-8"?>
+<p:sld xmlns:a="http://schemas.openxmlformats.org/drawingml/2006/main" xmlns:r="http://schemas.openxmlformats.org/officeDocument/2006/relationships" xmlns:p="http://schemas.openxmlformats.org/presentationml/2006/main">
+  <p:cSld>
+    <p:bg>
+      <p:bgPr>
+        <a:solidFill>
+          <a:schemeClr val="bg1"/>
+        </a:solidFill>
+        <a:effectLst/>
+      </p:bgPr>
+    </p:bg>
+    <p:spTree>
+      <p:nvGrpSpPr>
+        <p:cNvPr id="1" name=""/>
+        <p:cNvGrpSpPr/>
+        <p:nvPr/>
+      </p:nvGrpSpPr>
+      <p:grpSpPr>
+        <a:xfrm>
+          <a:off x="0" y="0"/>
+          <a:ext cx="0" cy="0"/>
+          <a:chOff x="0" y="0"/>
+          <a:chExt cx="0" cy="0"/>
+        </a:xfrm>
+      </p:grpSpPr>
+      <p:sp>
+        <p:nvSpPr>
+          <p:cNvPr id="10" name="Rectangle 9">
+            <a:extLst>
+              <a:ext uri="{FF2B5EF4-FFF2-40B4-BE49-F238E27FC236}">
+                <a16:creationId xmlns:a16="http://schemas.microsoft.com/office/drawing/2014/main" id="{00401440-1DC9-4C9E-A3BA-4DECEEB46503}"/>
+              </a:ext>
+              <a:ext uri="{C183D7F6-B498-43B3-948B-1728B52AA6E4}">
+                <adec:decorative xmlns:adec="http://schemas.microsoft.com/office/drawing/2017/decorative" val="1"/>
+              </a:ext>
+            </a:extLst>
+          </p:cNvPr>
+          <p:cNvSpPr>
+            <a:spLocks noGrp="1" noRot="1" noChangeAspect="1" noMove="1" noResize="1" noEditPoints="1" noAdjustHandles="1" noChangeArrowheads="1" noChangeShapeType="1" noTextEdit="1"/>
+          </p:cNvSpPr>
+          <p:nvPr>
+            <p:extLst>
+              <p:ext uri="{386F3935-93C4-4BCD-93E2-E3B085C9AB24}">
+                <p16:designElem xmlns:p16="http://schemas.microsoft.com/office/powerpoint/2015/main" val="1"/>
+              </p:ext>
+            </p:extLst>
+          </p:nvPr>
+        </p:nvSpPr>
+        <p:spPr>
+          <a:xfrm>
+            <a:off x="0" y="0"/>
+            <a:ext cx="12192000" cy="6858000"/>
+          </a:xfrm>
+          <a:prstGeom prst="rect">
+            <a:avLst/>
+          </a:prstGeom>
+          <a:solidFill>
+            <a:schemeClr val="bg1"/>
+          </a:solidFill>
+          <a:ln>
+            <a:noFill/>
+          </a:ln>
+        </p:spPr>
+        <p:style>
+          <a:lnRef idx="2">
+            <a:schemeClr val="accent1">
+              <a:shade val="50000"/>
+            </a:schemeClr>
+          </a:lnRef>
+          <a:fillRef idx="1">
+            <a:schemeClr val="accent1"/>
+          </a:fillRef>
+          <a:effectRef idx="0">
+            <a:schemeClr val="accent1"/>
+          </a:effectRef>
+          <a:fontRef idx="minor">
+            <a:schemeClr val="lt1"/>
+          </a:fontRef>
+        </p:style>
+        <p:txBody>
+          <a:bodyPr rtlCol="0" anchor="ctr"/>
+          <a:lstStyle/>
+          <a:p>
+            <a:pPr algn="ctr"/>
+            <a:endParaRPr lang="en-US" dirty="0"/>
+          </a:p>
+        </p:txBody>
+      </p:sp>
+      <p:pic>
+        <p:nvPicPr>
+          <p:cNvPr id="5" name="Picture 4">
+            <a:extLst>
+              <a:ext uri="{FF2B5EF4-FFF2-40B4-BE49-F238E27FC236}">
+                <a16:creationId xmlns:a16="http://schemas.microsoft.com/office/drawing/2014/main" id="{09484B50-F624-4275-9301-DF7882590668}"/>
+              </a:ext>
+            </a:extLst>
+          </p:cNvPr>
+          <p:cNvPicPr>
+            <a:picLocks noChangeAspect="1"/>
+          </p:cNvPicPr>
+          <p:nvPr/>
+        </p:nvPicPr>
+        <p:blipFill rotWithShape="1">
+          <a:blip r:embed="rId2"/>
+          <a:srcRect l="4806" t="10444" r="70290" b="23762"/>
+          <a:stretch/>
+        </p:blipFill>
+        <p:spPr>
+          <a:xfrm>
+            <a:off x="6291750" y="165803"/>
+            <a:ext cx="5272125" cy="3934751"/>
+          </a:xfrm>
+          <a:prstGeom prst="rect">
+            <a:avLst/>
+          </a:prstGeom>
+        </p:spPr>
+      </p:pic>
+      <p:cxnSp>
+        <p:nvCxnSpPr>
+          <p:cNvPr id="12" name="Straight Connector 11">
+            <a:extLst>
+              <a:ext uri="{FF2B5EF4-FFF2-40B4-BE49-F238E27FC236}">
+                <a16:creationId xmlns:a16="http://schemas.microsoft.com/office/drawing/2014/main" id="{EEE3F140-02CB-4BBC-ABC0-8BF046C9D1B8}"/>
+              </a:ext>
+              <a:ext uri="{C183D7F6-B498-43B3-948B-1728B52AA6E4}">
+                <adec:decorative xmlns:adec="http://schemas.microsoft.com/office/drawing/2017/decorative" val="1"/>
+              </a:ext>
+            </a:extLst>
+          </p:cNvPr>
+          <p:cNvCxnSpPr>
+            <a:cxnSpLocks noGrp="1" noRot="1" noChangeAspect="1" noMove="1" noResize="1" noEditPoints="1" noAdjustHandles="1" noChangeArrowheads="1" noChangeShapeType="1"/>
+          </p:cNvCxnSpPr>
+          <p:nvPr>
+            <p:extLst>
+              <p:ext uri="{386F3935-93C4-4BCD-93E2-E3B085C9AB24}">
+                <p16:designElem xmlns:p16="http://schemas.microsoft.com/office/powerpoint/2015/main" val="1"/>
+              </p:ext>
+            </p:extLst>
+          </p:nvPr>
+        </p:nvCxnSpPr>
+        <p:spPr>
+          <a:xfrm>
+            <a:off x="6096000" y="1436050"/>
+            <a:ext cx="0" cy="1645920"/>
+          </a:xfrm>
+          <a:prstGeom prst="line">
+            <a:avLst/>
+          </a:prstGeom>
+          <a:ln w="19050">
+            <a:solidFill>
+              <a:srgbClr val="465359"/>
+            </a:solidFill>
+          </a:ln>
+        </p:spPr>
+        <p:style>
+          <a:lnRef idx="1">
+            <a:schemeClr val="accent1"/>
+          </a:lnRef>
+          <a:fillRef idx="0">
+            <a:schemeClr val="accent1"/>
+          </a:fillRef>
+          <a:effectRef idx="0">
+            <a:schemeClr val="accent1"/>
+          </a:effectRef>
+          <a:fontRef idx="minor">
+            <a:schemeClr val="tx1"/>
+          </a:fontRef>
+        </p:style>
+      </p:cxnSp>
+      <p:pic>
+        <p:nvPicPr>
+          <p:cNvPr id="4" name="Picture 3" descr="A screenshot of a computer screen&#10;&#10;Description automatically generated">
+            <a:extLst>
+              <a:ext uri="{FF2B5EF4-FFF2-40B4-BE49-F238E27FC236}">
+                <a16:creationId xmlns:a16="http://schemas.microsoft.com/office/drawing/2014/main" id="{F5F08624-9494-4D44-A689-816A958F959C}"/>
+              </a:ext>
+            </a:extLst>
+          </p:cNvPr>
+          <p:cNvPicPr>
+            <a:picLocks noChangeAspect="1"/>
+          </p:cNvPicPr>
+          <p:nvPr/>
+        </p:nvPicPr>
+        <p:blipFill rotWithShape="1">
+          <a:blip r:embed="rId3"/>
+          <a:srcRect l="54870" t="10253" r="21311" b="26883"/>
+          <a:stretch/>
+        </p:blipFill>
+        <p:spPr>
+          <a:xfrm>
+            <a:off x="447234" y="165803"/>
+            <a:ext cx="5272125" cy="3934751"/>
+          </a:xfrm>
+          <a:prstGeom prst="rect">
+            <a:avLst/>
+          </a:prstGeom>
+        </p:spPr>
+      </p:pic>
+      <p:sp>
+        <p:nvSpPr>
+          <p:cNvPr id="14" name="Rectangle 13">
+            <a:extLst>
+              <a:ext uri="{FF2B5EF4-FFF2-40B4-BE49-F238E27FC236}">
+                <a16:creationId xmlns:a16="http://schemas.microsoft.com/office/drawing/2014/main" id="{36B822CC-7DA9-4417-AA94-64CEB676F0B8}"/>
+              </a:ext>
+              <a:ext uri="{C183D7F6-B498-43B3-948B-1728B52AA6E4}">
+                <adec:decorative xmlns:adec="http://schemas.microsoft.com/office/drawing/2017/decorative" val="1"/>
+              </a:ext>
+            </a:extLst>
+          </p:cNvPr>
+          <p:cNvSpPr>
+            <a:spLocks noGrp="1" noRot="1" noChangeAspect="1" noMove="1" noResize="1" noEditPoints="1" noAdjustHandles="1" noChangeArrowheads="1" noChangeShapeType="1" noTextEdit="1"/>
+          </p:cNvSpPr>
+          <p:nvPr>
+            <p:extLst>
+              <p:ext uri="{386F3935-93C4-4BCD-93E2-E3B085C9AB24}">
+                <p16:designElem xmlns:p16="http://schemas.microsoft.com/office/powerpoint/2015/main" val="1"/>
+              </p:ext>
+            </p:extLst>
+          </p:nvPr>
+        </p:nvSpPr>
+        <p:spPr>
+          <a:xfrm>
+            <a:off x="447234" y="4219240"/>
+            <a:ext cx="11301984" cy="94997"/>
+          </a:xfrm>
+          <a:prstGeom prst="rect">
+            <a:avLst/>
+          </a:prstGeom>
+          <a:solidFill>
+            <a:srgbClr val="465359"/>
+          </a:solidFill>
+          <a:ln>
+            <a:noFill/>
+          </a:ln>
+          <a:effectLst/>
+        </p:spPr>
+        <p:style>
+          <a:lnRef idx="1">
+            <a:schemeClr val="accent1"/>
+          </a:lnRef>
+          <a:fillRef idx="3">
+            <a:schemeClr val="accent1"/>
+          </a:fillRef>
+          <a:effectRef idx="2">
+            <a:schemeClr val="accent1"/>
+          </a:effectRef>
+          <a:fontRef idx="minor">
+            <a:schemeClr val="lt1"/>
+          </a:fontRef>
+        </p:style>
+      </p:sp>
+      <p:sp>
+        <p:nvSpPr>
+          <p:cNvPr id="16" name="Rectangle 15">
+            <a:extLst>
+              <a:ext uri="{FF2B5EF4-FFF2-40B4-BE49-F238E27FC236}">
+                <a16:creationId xmlns:a16="http://schemas.microsoft.com/office/drawing/2014/main" id="{AFA01E88-71CC-4FF3-9E81-51E0C32B45E4}"/>
+              </a:ext>
+              <a:ext uri="{C183D7F6-B498-43B3-948B-1728B52AA6E4}">
+                <adec:decorative xmlns:adec="http://schemas.microsoft.com/office/drawing/2017/decorative" val="1"/>
+              </a:ext>
+            </a:extLst>
+          </p:cNvPr>
+          <p:cNvSpPr>
+            <a:spLocks noGrp="1" noRot="1" noChangeAspect="1" noMove="1" noResize="1" noEditPoints="1" noAdjustHandles="1" noChangeArrowheads="1" noChangeShapeType="1" noTextEdit="1"/>
+          </p:cNvSpPr>
+          <p:nvPr>
+            <p:extLst>
+              <p:ext uri="{386F3935-93C4-4BCD-93E2-E3B085C9AB24}">
+                <p16:designElem xmlns:p16="http://schemas.microsoft.com/office/powerpoint/2015/main" val="1"/>
+              </p:ext>
+            </p:extLst>
+          </p:nvPr>
+        </p:nvSpPr>
+        <p:spPr>
+          <a:xfrm>
+            <a:off x="447234" y="4359623"/>
+            <a:ext cx="11303626" cy="2051143"/>
+          </a:xfrm>
+          <a:prstGeom prst="rect">
+            <a:avLst/>
+          </a:prstGeom>
+          <a:solidFill>
+            <a:srgbClr val="465359"/>
+          </a:solidFill>
+          <a:ln w="6350" cmpd="sng">
+            <a:noFill/>
+          </a:ln>
+          <a:effectLst/>
+        </p:spPr>
+        <p:style>
+          <a:lnRef idx="1">
+            <a:schemeClr val="accent1"/>
+          </a:lnRef>
+          <a:fillRef idx="3">
+            <a:schemeClr val="accent1"/>
+          </a:fillRef>
+          <a:effectRef idx="2">
+            <a:schemeClr val="accent1"/>
+          </a:effectRef>
+          <a:fontRef idx="minor">
+            <a:schemeClr val="lt1"/>
+          </a:fontRef>
+        </p:style>
+      </p:sp>
+      <p:sp>
+        <p:nvSpPr>
+          <p:cNvPr id="2" name="Title 1">
+            <a:extLst>
+              <a:ext uri="{FF2B5EF4-FFF2-40B4-BE49-F238E27FC236}">
+                <a16:creationId xmlns:a16="http://schemas.microsoft.com/office/drawing/2014/main" id="{38EA5DDF-3AD4-4AFD-86A0-513E849D8373}"/>
+              </a:ext>
+            </a:extLst>
+          </p:cNvPr>
+          <p:cNvSpPr>
+            <a:spLocks noGrp="1"/>
+          </p:cNvSpPr>
+          <p:nvPr>
+            <p:ph type="title"/>
+          </p:nvPr>
+        </p:nvSpPr>
+        <p:spPr>
+          <a:xfrm>
+            <a:off x="679600" y="4596992"/>
+            <a:ext cx="3353432" cy="1607013"/>
+          </a:xfrm>
+        </p:spPr>
+        <p:txBody>
+          <a:bodyPr anchor="ctr">
+            <a:normAutofit/>
+          </a:bodyPr>
+          <a:lstStyle/>
+          <a:p>
+            <a:r>
+              <a:rPr lang="en-GB">
+                <a:solidFill>
+                  <a:srgbClr val="FFFFFF"/>
+                </a:solidFill>
+              </a:rPr>
+              <a:t>Program</a:t>
+            </a:r>
+          </a:p>
+        </p:txBody>
+      </p:sp>
+      <p:sp>
+        <p:nvSpPr>
+          <p:cNvPr id="3" name="Content Placeholder 2">
+            <a:extLst>
+              <a:ext uri="{FF2B5EF4-FFF2-40B4-BE49-F238E27FC236}">
+                <a16:creationId xmlns:a16="http://schemas.microsoft.com/office/drawing/2014/main" id="{E9C82538-4153-4911-8105-16B3FC6BA16F}"/>
+              </a:ext>
+            </a:extLst>
+          </p:cNvPr>
+          <p:cNvSpPr>
+            <a:spLocks noGrp="1"/>
+          </p:cNvSpPr>
+          <p:nvPr>
+            <p:ph idx="1"/>
+          </p:nvPr>
+        </p:nvSpPr>
+        <p:spPr>
+          <a:xfrm>
+            <a:off x="2659309" y="4581687"/>
+            <a:ext cx="8853091" cy="1607013"/>
+          </a:xfrm>
+        </p:spPr>
+        <p:txBody>
+          <a:bodyPr>
+            <a:normAutofit fontScale="85000" lnSpcReduction="20000"/>
+          </a:bodyPr>
+          <a:lstStyle/>
+          <a:p>
+            <a:pPr marL="0" indent="0">
+              <a:buNone/>
+            </a:pPr>
+            <a:r>
+              <a:rPr lang="en-GB" dirty="0">
+                <a:solidFill>
+                  <a:srgbClr val="FFFFFF"/>
+                </a:solidFill>
+              </a:rPr>
+              <a:t>Our program has implemented all the voting rules from the EU Council Voting Calculator: Qualified Majority, Reinforced Qualified Majority, Simple Majority and Unanimity</a:t>
+            </a:r>
+          </a:p>
+          <a:p>
+            <a:pPr marL="0" indent="0">
+              <a:buNone/>
+            </a:pPr>
+            <a:r>
+              <a:rPr lang="en-GB" dirty="0">
+                <a:solidFill>
+                  <a:srgbClr val="FFFFFF"/>
+                </a:solidFill>
+              </a:rPr>
+              <a:t>Each voting rule has different parameters that need to be passed in order for the result to be approved, as seen these parameters were set in the code and adjusted for each voting rule: Qualified Majority needing greater than 15 states and these states need to have a population greater than 65%. If these parameters are passed then the result is approved. Otherwise, the result will be Rejected</a:t>
+            </a:r>
+          </a:p>
+          <a:p>
+            <a:pPr marL="0" indent="0">
+              <a:buNone/>
+            </a:pPr>
+            <a:endParaRPr lang="en-GB" dirty="0">
+              <a:solidFill>
+                <a:srgbClr val="FFFFFF"/>
+              </a:solidFill>
+            </a:endParaRPr>
+          </a:p>
+        </p:txBody>
+      </p:sp>
+      <p:sp>
+        <p:nvSpPr>
+          <p:cNvPr id="6" name="Oval 5">
+            <a:extLst>
+              <a:ext uri="{FF2B5EF4-FFF2-40B4-BE49-F238E27FC236}">
+                <a16:creationId xmlns:a16="http://schemas.microsoft.com/office/drawing/2014/main" id="{DA5D021C-AD11-438D-A6FC-7F2E169F73F5}"/>
+              </a:ext>
+            </a:extLst>
+          </p:cNvPr>
+          <p:cNvSpPr/>
+          <p:nvPr/>
+        </p:nvSpPr>
+        <p:spPr>
+          <a:xfrm>
+            <a:off x="-180891" y="805344"/>
+            <a:ext cx="3670711" cy="1693033"/>
+          </a:xfrm>
+          <a:prstGeom prst="ellipse">
+            <a:avLst/>
+          </a:prstGeom>
+          <a:noFill/>
+          <a:ln w="3175"/>
+        </p:spPr>
+        <p:style>
+          <a:lnRef idx="2">
+            <a:schemeClr val="accent1">
+              <a:shade val="50000"/>
+            </a:schemeClr>
+          </a:lnRef>
+          <a:fillRef idx="1">
+            <a:schemeClr val="accent1"/>
+          </a:fillRef>
+          <a:effectRef idx="0">
+            <a:schemeClr val="accent1"/>
+          </a:effectRef>
+          <a:fontRef idx="minor">
+            <a:schemeClr val="lt1"/>
+          </a:fontRef>
+        </p:style>
+        <p:txBody>
+          <a:bodyPr rtlCol="0" anchor="ctr"/>
+          <a:lstStyle/>
+          <a:p>
+            <a:pPr algn="ctr"/>
+            <a:endParaRPr lang="en-GB"/>
+          </a:p>
+        </p:txBody>
+      </p:sp>
+    </p:spTree>
+    <p:extLst>
+      <p:ext uri="{BB962C8B-B14F-4D97-AF65-F5344CB8AC3E}">
+        <p14:creationId xmlns:p14="http://schemas.microsoft.com/office/powerpoint/2010/main" val="4218154308"/>
+      </p:ext>
+    </p:extLst>
+  </p:cSld>
+  <p:clrMapOvr>
+    <a:masterClrMapping/>
+  </p:clrMapOvr>
+</p:sld>
+</file>
+
+<file path=ppt/slides/slide5.xml><?xml version="1.0" encoding="utf-8"?>
+<p:sld xmlns:a="http://schemas.openxmlformats.org/drawingml/2006/main" xmlns:r="http://schemas.openxmlformats.org/officeDocument/2006/relationships" xmlns:p="http://schemas.openxmlformats.org/presentationml/2006/main">
+  <p:cSld>
+    <p:bg>
+      <p:bgPr>
+        <a:solidFill>
+          <a:schemeClr val="bg1"/>
+        </a:solidFill>
+        <a:effectLst/>
+      </p:bgPr>
+    </p:bg>
+    <p:spTree>
+      <p:nvGrpSpPr>
+        <p:cNvPr id="1" name=""/>
+        <p:cNvGrpSpPr/>
+        <p:nvPr/>
+      </p:nvGrpSpPr>
+      <p:grpSpPr>
+        <a:xfrm>
+          <a:off x="0" y="0"/>
+          <a:ext cx="0" cy="0"/>
+          <a:chOff x="0" y="0"/>
+          <a:chExt cx="0" cy="0"/>
+        </a:xfrm>
+      </p:grpSpPr>
+      <p:sp>
+        <p:nvSpPr>
+          <p:cNvPr id="9" name="Rectangle 8">
+            <a:extLst>
+              <a:ext uri="{FF2B5EF4-FFF2-40B4-BE49-F238E27FC236}">
+                <a16:creationId xmlns:a16="http://schemas.microsoft.com/office/drawing/2014/main" id="{E9751CB9-7B25-4EB8-9A6F-82F822549F12}"/>
+              </a:ext>
+              <a:ext uri="{C183D7F6-B498-43B3-948B-1728B52AA6E4}">
+                <adec:decorative xmlns:adec="http://schemas.microsoft.com/office/drawing/2017/decorative" val="1"/>
+              </a:ext>
+            </a:extLst>
+          </p:cNvPr>
+          <p:cNvSpPr>
+            <a:spLocks noGrp="1" noRot="1" noChangeAspect="1" noMove="1" noResize="1" noEditPoints="1" noAdjustHandles="1" noChangeArrowheads="1" noChangeShapeType="1" noTextEdit="1"/>
+          </p:cNvSpPr>
+          <p:nvPr>
+            <p:extLst>
+              <p:ext uri="{386F3935-93C4-4BCD-93E2-E3B085C9AB24}">
+                <p16:designElem xmlns:p16="http://schemas.microsoft.com/office/powerpoint/2015/main" val="1"/>
+              </p:ext>
+            </p:extLst>
+          </p:nvPr>
+        </p:nvSpPr>
+        <p:spPr>
+          <a:xfrm>
+            <a:off x="0" y="0"/>
+            <a:ext cx="12192000" cy="6858000"/>
+          </a:xfrm>
+          <a:prstGeom prst="rect">
+            <a:avLst/>
+          </a:prstGeom>
+          <a:solidFill>
+            <a:srgbClr val="FFFFFF"/>
+          </a:solidFill>
+          <a:ln>
+            <a:noFill/>
+          </a:ln>
+        </p:spPr>
+        <p:style>
+          <a:lnRef idx="2">
+            <a:schemeClr val="accent1">
+              <a:shade val="50000"/>
+            </a:schemeClr>
+          </a:lnRef>
+          <a:fillRef idx="1">
+            <a:schemeClr val="accent1"/>
+          </a:fillRef>
+          <a:effectRef idx="0">
+            <a:schemeClr val="accent1"/>
+          </a:effectRef>
+          <a:fontRef idx="minor">
+            <a:schemeClr val="lt1"/>
+          </a:fontRef>
+        </p:style>
+        <p:txBody>
+          <a:bodyPr rtlCol="0" anchor="ctr"/>
+          <a:lstStyle/>
+          <a:p>
+            <a:pPr algn="ctr"/>
+            <a:endParaRPr lang="en-US"/>
+          </a:p>
+        </p:txBody>
+      </p:sp>
+      <p:sp>
+        <p:nvSpPr>
+          <p:cNvPr id="11" name="Rectangle 10">
+            <a:extLst>
+              <a:ext uri="{FF2B5EF4-FFF2-40B4-BE49-F238E27FC236}">
+                <a16:creationId xmlns:a16="http://schemas.microsoft.com/office/drawing/2014/main" id="{E1317383-CF3B-4B02-9512-BECBEF6362A4}"/>
+              </a:ext>
+              <a:ext uri="{C183D7F6-B498-43B3-948B-1728B52AA6E4}">
+                <adec:decorative xmlns:adec="http://schemas.microsoft.com/office/drawing/2017/decorative" val="1"/>
+              </a:ext>
+            </a:extLst>
+          </p:cNvPr>
+          <p:cNvSpPr>
+            <a:spLocks noGrp="1" noRot="1" noChangeAspect="1" noMove="1" noResize="1" noEditPoints="1" noAdjustHandles="1" noChangeArrowheads="1" noChangeShapeType="1" noTextEdit="1"/>
+          </p:cNvSpPr>
+          <p:nvPr>
+            <p:extLst>
+              <p:ext uri="{386F3935-93C4-4BCD-93E2-E3B085C9AB24}">
+                <p16:designElem xmlns:p16="http://schemas.microsoft.com/office/powerpoint/2015/main" val="1"/>
+              </p:ext>
+            </p:extLst>
+          </p:nvPr>
+        </p:nvSpPr>
+        <p:spPr>
+          <a:xfrm>
+            <a:off x="446534" y="457200"/>
+            <a:ext cx="3703320" cy="94997"/>
+          </a:xfrm>
+          <a:prstGeom prst="rect">
+            <a:avLst/>
+          </a:prstGeom>
+          <a:solidFill>
+            <a:srgbClr val="465359"/>
+          </a:solidFill>
+          <a:ln>
+            <a:noFill/>
+          </a:ln>
+          <a:effectLst/>
+        </p:spPr>
+        <p:style>
+          <a:lnRef idx="1">
+            <a:schemeClr val="accent1"/>
+          </a:lnRef>
+          <a:fillRef idx="3">
+            <a:schemeClr val="accent1"/>
+          </a:fillRef>
+          <a:effectRef idx="2">
+            <a:schemeClr val="accent1"/>
+          </a:effectRef>
+          <a:fontRef idx="minor">
+            <a:schemeClr val="lt1"/>
+          </a:fontRef>
+        </p:style>
+      </p:sp>
+      <p:sp>
+        <p:nvSpPr>
+          <p:cNvPr id="13" name="Rectangle 12">
+            <a:extLst>
+              <a:ext uri="{FF2B5EF4-FFF2-40B4-BE49-F238E27FC236}">
+                <a16:creationId xmlns:a16="http://schemas.microsoft.com/office/drawing/2014/main" id="{B1D4C7A0-6DF2-4F2D-A45D-F111582974C7}"/>
+              </a:ext>
+              <a:ext uri="{C183D7F6-B498-43B3-948B-1728B52AA6E4}">
+                <adec:decorative xmlns:adec="http://schemas.microsoft.com/office/drawing/2017/decorative" val="1"/>
+              </a:ext>
+            </a:extLst>
+          </p:cNvPr>
+          <p:cNvSpPr>
+            <a:spLocks noGrp="1" noRot="1" noChangeAspect="1" noMove="1" noResize="1" noEditPoints="1" noAdjustHandles="1" noChangeArrowheads="1" noChangeShapeType="1" noTextEdit="1"/>
+          </p:cNvSpPr>
+          <p:nvPr>
+            <p:extLst>
+              <p:ext uri="{386F3935-93C4-4BCD-93E2-E3B085C9AB24}">
+                <p16:designElem xmlns:p16="http://schemas.microsoft.com/office/powerpoint/2015/main" val="1"/>
+              </p:ext>
+            </p:extLst>
+          </p:nvPr>
+        </p:nvSpPr>
+        <p:spPr>
+          <a:xfrm>
+            <a:off x="4241830" y="457200"/>
+            <a:ext cx="3703320" cy="91440"/>
+          </a:xfrm>
+          <a:prstGeom prst="rect">
+            <a:avLst/>
+          </a:prstGeom>
+          <a:solidFill>
+            <a:schemeClr val="accent1"/>
+          </a:solidFill>
+          <a:ln>
+            <a:noFill/>
+          </a:ln>
+          <a:effectLst/>
+        </p:spPr>
+        <p:style>
+          <a:lnRef idx="1">
+            <a:schemeClr val="accent1"/>
+          </a:lnRef>
+          <a:fillRef idx="3">
+            <a:schemeClr val="accent1"/>
+          </a:fillRef>
+          <a:effectRef idx="2">
+            <a:schemeClr val="accent1"/>
+          </a:effectRef>
+          <a:fontRef idx="minor">
+            <a:schemeClr val="lt1"/>
+          </a:fontRef>
+        </p:style>
+      </p:sp>
+      <p:sp>
+        <p:nvSpPr>
+          <p:cNvPr id="15" name="Rectangle 14">
+            <a:extLst>
+              <a:ext uri="{FF2B5EF4-FFF2-40B4-BE49-F238E27FC236}">
+                <a16:creationId xmlns:a16="http://schemas.microsoft.com/office/drawing/2014/main" id="{DBF3943D-BCB6-4B31-809D-A005686483B4}"/>
+              </a:ext>
+              <a:ext uri="{C183D7F6-B498-43B3-948B-1728B52AA6E4}">
+                <adec:decorative xmlns:adec="http://schemas.microsoft.com/office/drawing/2017/decorative" val="1"/>
+              </a:ext>
+            </a:extLst>
+          </p:cNvPr>
+          <p:cNvSpPr>
+            <a:spLocks noGrp="1" noRot="1" noChangeAspect="1" noMove="1" noResize="1" noEditPoints="1" noAdjustHandles="1" noChangeArrowheads="1" noChangeShapeType="1" noTextEdit="1"/>
+          </p:cNvSpPr>
+          <p:nvPr>
+            <p:extLst>
+              <p:ext uri="{386F3935-93C4-4BCD-93E2-E3B085C9AB24}">
+                <p16:designElem xmlns:p16="http://schemas.microsoft.com/office/powerpoint/2015/main" val="1"/>
+              </p:ext>
+            </p:extLst>
+          </p:nvPr>
+        </p:nvSpPr>
+        <p:spPr>
+          <a:xfrm>
+            <a:off x="8042147" y="453643"/>
+            <a:ext cx="3703320" cy="98554"/>
+          </a:xfrm>
+          <a:prstGeom prst="rect">
+            <a:avLst/>
+          </a:prstGeom>
+          <a:solidFill>
+            <a:srgbClr val="969FA7"/>
+          </a:solidFill>
+          <a:ln>
+            <a:noFill/>
+          </a:ln>
+          <a:effectLst/>
+        </p:spPr>
+        <p:style>
+          <a:lnRef idx="1">
+            <a:schemeClr val="accent1"/>
+          </a:lnRef>
+          <a:fillRef idx="3">
+            <a:schemeClr val="accent1"/>
+          </a:fillRef>
+          <a:effectRef idx="2">
+            <a:schemeClr val="accent1"/>
+          </a:effectRef>
+          <a:fontRef idx="minor">
+            <a:schemeClr val="lt1"/>
+          </a:fontRef>
+        </p:style>
+      </p:sp>
+      <p:sp>
+        <p:nvSpPr>
+          <p:cNvPr id="17" name="Rectangle 16">
+            <a:extLst>
+              <a:ext uri="{FF2B5EF4-FFF2-40B4-BE49-F238E27FC236}">
+                <a16:creationId xmlns:a16="http://schemas.microsoft.com/office/drawing/2014/main" id="{39373A6F-2E1F-4613-8E1D-D68057D29F31}"/>
+              </a:ext>
+              <a:ext uri="{C183D7F6-B498-43B3-948B-1728B52AA6E4}">
+                <adec:decorative xmlns:adec="http://schemas.microsoft.com/office/drawing/2017/decorative" val="1"/>
+              </a:ext>
+            </a:extLst>
+          </p:cNvPr>
+          <p:cNvSpPr>
+            <a:spLocks noGrp="1" noRot="1" noChangeAspect="1" noMove="1" noResize="1" noEditPoints="1" noAdjustHandles="1" noChangeArrowheads="1" noChangeShapeType="1" noTextEdit="1"/>
+          </p:cNvSpPr>
+          <p:nvPr>
+            <p:extLst>
+              <p:ext uri="{386F3935-93C4-4BCD-93E2-E3B085C9AB24}">
+                <p16:designElem xmlns:p16="http://schemas.microsoft.com/office/powerpoint/2015/main" val="1"/>
+              </p:ext>
+            </p:extLst>
+          </p:nvPr>
+        </p:nvSpPr>
+        <p:spPr>
+          <a:xfrm>
+            <a:off x="442377" y="601200"/>
+            <a:ext cx="3707477" cy="5624979"/>
+          </a:xfrm>
+          <a:prstGeom prst="rect">
+            <a:avLst/>
+          </a:prstGeom>
+          <a:solidFill>
+            <a:srgbClr val="465359"/>
+          </a:solidFill>
+          <a:ln>
+            <a:noFill/>
+          </a:ln>
+          <a:effectLst/>
+        </p:spPr>
+        <p:style>
+          <a:lnRef idx="1">
+            <a:schemeClr val="accent1"/>
+          </a:lnRef>
+          <a:fillRef idx="3">
+            <a:schemeClr val="accent1"/>
+          </a:fillRef>
+          <a:effectRef idx="2">
+            <a:schemeClr val="accent1"/>
+          </a:effectRef>
+          <a:fontRef idx="minor">
+            <a:schemeClr val="lt1"/>
+          </a:fontRef>
+        </p:style>
+      </p:sp>
+      <p:sp>
+        <p:nvSpPr>
+          <p:cNvPr id="3" name="Content Placeholder 2">
+            <a:extLst>
+              <a:ext uri="{FF2B5EF4-FFF2-40B4-BE49-F238E27FC236}">
+                <a16:creationId xmlns:a16="http://schemas.microsoft.com/office/drawing/2014/main" id="{48C5E8CB-3009-4679-9A1A-C614DC0F95D0}"/>
+              </a:ext>
+            </a:extLst>
+          </p:cNvPr>
+          <p:cNvSpPr>
+            <a:spLocks noGrp="1"/>
+          </p:cNvSpPr>
+          <p:nvPr>
+            <p:ph idx="1"/>
+          </p:nvPr>
+        </p:nvSpPr>
+        <p:spPr>
+          <a:xfrm>
+            <a:off x="591224" y="601200"/>
+            <a:ext cx="3409782" cy="5624979"/>
+          </a:xfrm>
+        </p:spPr>
+        <p:txBody>
+          <a:bodyPr>
+            <a:normAutofit/>
+          </a:bodyPr>
+          <a:lstStyle/>
+          <a:p>
+            <a:pPr marL="0" indent="0">
+              <a:buNone/>
+            </a:pPr>
+            <a:r>
+              <a:rPr lang="en-GB" dirty="0">
+                <a:solidFill>
+                  <a:srgbClr val="FFFFFF"/>
+                </a:solidFill>
+              </a:rPr>
+              <a:t>This is the replica of the voting calculator presented in a Windows Form presentation</a:t>
+            </a:r>
+          </a:p>
+          <a:p>
+            <a:pPr marL="0" indent="0">
+              <a:buNone/>
+            </a:pPr>
+            <a:r>
+              <a:rPr lang="en-GB" dirty="0">
+                <a:solidFill>
+                  <a:srgbClr val="FFFFFF"/>
+                </a:solidFill>
+              </a:rPr>
+              <a:t>Each country is listed along with their respective population percentage, each country has the choice of Yes, No and Abstain.</a:t>
+            </a:r>
+          </a:p>
+          <a:p>
+            <a:pPr marL="0" indent="0">
+              <a:buNone/>
+            </a:pPr>
+            <a:r>
+              <a:rPr lang="en-GB" dirty="0">
+                <a:solidFill>
+                  <a:srgbClr val="FFFFFF"/>
+                </a:solidFill>
+              </a:rPr>
+              <a:t>The form also displays the Voting States with an active tally on how many countries voted Yes, No or Abstain, along with the voting population with the overall percentage.</a:t>
+            </a:r>
+          </a:p>
+          <a:p>
+            <a:pPr marL="0" indent="0">
+              <a:buNone/>
+            </a:pPr>
+            <a:endParaRPr lang="en-GB" dirty="0">
+              <a:solidFill>
+                <a:srgbClr val="FFFFFF"/>
+              </a:solidFill>
+            </a:endParaRPr>
+          </a:p>
+        </p:txBody>
+      </p:sp>
+      <p:pic>
+        <p:nvPicPr>
+          <p:cNvPr id="4" name="Picture 3">
+            <a:extLst>
+              <a:ext uri="{FF2B5EF4-FFF2-40B4-BE49-F238E27FC236}">
+                <a16:creationId xmlns:a16="http://schemas.microsoft.com/office/drawing/2014/main" id="{E05AD833-BD67-44CF-B608-8FF9FCD0373B}"/>
+              </a:ext>
+            </a:extLst>
+          </p:cNvPr>
+          <p:cNvPicPr>
+            <a:picLocks noChangeAspect="1"/>
+          </p:cNvPicPr>
+          <p:nvPr/>
+        </p:nvPicPr>
+        <p:blipFill rotWithShape="1">
+          <a:blip r:embed="rId2"/>
+          <a:srcRect l="18989" t="24589" r="59021" b="28095"/>
+          <a:stretch/>
+        </p:blipFill>
+        <p:spPr>
+          <a:xfrm>
+            <a:off x="4544467" y="1314644"/>
+            <a:ext cx="6995359" cy="4252128"/>
+          </a:xfrm>
+          <a:prstGeom prst="rect">
+            <a:avLst/>
+          </a:prstGeom>
+        </p:spPr>
+      </p:pic>
+    </p:spTree>
+    <p:extLst>
+      <p:ext uri="{BB962C8B-B14F-4D97-AF65-F5344CB8AC3E}">
+        <p14:creationId xmlns:p14="http://schemas.microsoft.com/office/powerpoint/2010/main" val="2067107532"/>
+      </p:ext>
+    </p:extLst>
+  </p:cSld>
+  <p:clrMapOvr>
+    <a:overrideClrMapping bg1="dk1" tx1="lt1" bg2="dk2" tx2="lt2" accent1="accent1" accent2="accent2" accent3="accent3" accent4="accent4" accent5="accent5" accent6="accent6" hlink="hlink" folHlink="folHlink"/>
+  </p:clrMapOvr>
+</p:sld>
+</file>
+
+<file path=ppt/slides/slide6.xml><?xml version="1.0" encoding="utf-8"?>
+<p:sld xmlns:a="http://schemas.openxmlformats.org/drawingml/2006/main" xmlns:r="http://schemas.openxmlformats.org/officeDocument/2006/relationships" xmlns:p="http://schemas.openxmlformats.org/presentationml/2006/main">
+  <p:cSld>
+    <p:bg>
+      <p:bgPr>
+        <a:solidFill>
+          <a:schemeClr val="bg1"/>
+        </a:solidFill>
+        <a:effectLst/>
+      </p:bgPr>
+    </p:bg>
+    <p:spTree>
+      <p:nvGrpSpPr>
+        <p:cNvPr id="1" name=""/>
+        <p:cNvGrpSpPr/>
+        <p:nvPr/>
+      </p:nvGrpSpPr>
+      <p:grpSpPr>
+        <a:xfrm>
+          <a:off x="0" y="0"/>
+          <a:ext cx="0" cy="0"/>
+          <a:chOff x="0" y="0"/>
+          <a:chExt cx="0" cy="0"/>
+        </a:xfrm>
+      </p:grpSpPr>
+      <p:sp>
+        <p:nvSpPr>
+          <p:cNvPr id="10" name="Rectangle 9">
+            <a:extLst>
+              <a:ext uri="{FF2B5EF4-FFF2-40B4-BE49-F238E27FC236}">
+                <a16:creationId xmlns:a16="http://schemas.microsoft.com/office/drawing/2014/main" id="{00401440-1DC9-4C9E-A3BA-4DECEEB46503}"/>
+              </a:ext>
+              <a:ext uri="{C183D7F6-B498-43B3-948B-1728B52AA6E4}">
+                <adec:decorative xmlns:adec="http://schemas.microsoft.com/office/drawing/2017/decorative" val="1"/>
+              </a:ext>
+            </a:extLst>
+          </p:cNvPr>
+          <p:cNvSpPr>
+            <a:spLocks noGrp="1" noRot="1" noChangeAspect="1" noMove="1" noResize="1" noEditPoints="1" noAdjustHandles="1" noChangeArrowheads="1" noChangeShapeType="1" noTextEdit="1"/>
+          </p:cNvSpPr>
+          <p:nvPr>
+            <p:extLst>
+              <p:ext uri="{386F3935-93C4-4BCD-93E2-E3B085C9AB24}">
+                <p16:designElem xmlns:p16="http://schemas.microsoft.com/office/powerpoint/2015/main" val="1"/>
+              </p:ext>
+            </p:extLst>
+          </p:nvPr>
+        </p:nvSpPr>
+        <p:spPr>
+          <a:xfrm>
+            <a:off x="0" y="0"/>
+            <a:ext cx="12192000" cy="6858000"/>
+          </a:xfrm>
+          <a:prstGeom prst="rect">
+            <a:avLst/>
+          </a:prstGeom>
+          <a:solidFill>
+            <a:schemeClr val="bg1"/>
+          </a:solidFill>
+          <a:ln>
+            <a:noFill/>
+          </a:ln>
+        </p:spPr>
+        <p:style>
+          <a:lnRef idx="2">
+            <a:schemeClr val="accent1">
+              <a:shade val="50000"/>
+            </a:schemeClr>
+          </a:lnRef>
+          <a:fillRef idx="1">
+            <a:schemeClr val="accent1"/>
+          </a:fillRef>
+          <a:effectRef idx="0">
+            <a:schemeClr val="accent1"/>
+          </a:effectRef>
+          <a:fontRef idx="minor">
+            <a:schemeClr val="lt1"/>
+          </a:fontRef>
+        </p:style>
+        <p:txBody>
+          <a:bodyPr rtlCol="0" anchor="ctr"/>
+          <a:lstStyle/>
+          <a:p>
+            <a:pPr algn="ctr"/>
+            <a:endParaRPr lang="en-US" dirty="0"/>
+          </a:p>
+        </p:txBody>
+      </p:sp>
+      <p:pic>
+        <p:nvPicPr>
+          <p:cNvPr id="5" name="Picture 4" descr="A screenshot of a computer screen&#10;&#10;Description automatically generated">
+            <a:extLst>
+              <a:ext uri="{FF2B5EF4-FFF2-40B4-BE49-F238E27FC236}">
+                <a16:creationId xmlns:a16="http://schemas.microsoft.com/office/drawing/2014/main" id="{D8D76F4F-2F6E-4069-9E4E-97D8C4040334}"/>
+              </a:ext>
+            </a:extLst>
+          </p:cNvPr>
+          <p:cNvPicPr>
+            <a:picLocks noChangeAspect="1"/>
+          </p:cNvPicPr>
+          <p:nvPr/>
+        </p:nvPicPr>
+        <p:blipFill rotWithShape="1">
+          <a:blip r:embed="rId2"/>
+          <a:srcRect l="50635" b="6054"/>
+          <a:stretch/>
+        </p:blipFill>
+        <p:spPr>
+          <a:xfrm>
+            <a:off x="6096000" y="534079"/>
+            <a:ext cx="5796871" cy="3151083"/>
+          </a:xfrm>
+          <a:prstGeom prst="rect">
+            <a:avLst/>
+          </a:prstGeom>
+        </p:spPr>
+      </p:pic>
+      <p:cxnSp>
+        <p:nvCxnSpPr>
+          <p:cNvPr id="12" name="Straight Connector 11">
+            <a:extLst>
+              <a:ext uri="{FF2B5EF4-FFF2-40B4-BE49-F238E27FC236}">
+                <a16:creationId xmlns:a16="http://schemas.microsoft.com/office/drawing/2014/main" id="{EEE3F140-02CB-4BBC-ABC0-8BF046C9D1B8}"/>
+              </a:ext>
+              <a:ext uri="{C183D7F6-B498-43B3-948B-1728B52AA6E4}">
+                <adec:decorative xmlns:adec="http://schemas.microsoft.com/office/drawing/2017/decorative" val="1"/>
+              </a:ext>
+            </a:extLst>
+          </p:cNvPr>
+          <p:cNvCxnSpPr>
+            <a:cxnSpLocks noGrp="1" noRot="1" noChangeAspect="1" noMove="1" noResize="1" noEditPoints="1" noAdjustHandles="1" noChangeArrowheads="1" noChangeShapeType="1"/>
+          </p:cNvCxnSpPr>
+          <p:nvPr>
+            <p:extLst>
+              <p:ext uri="{386F3935-93C4-4BCD-93E2-E3B085C9AB24}">
+                <p16:designElem xmlns:p16="http://schemas.microsoft.com/office/powerpoint/2015/main" val="1"/>
+              </p:ext>
+            </p:extLst>
+          </p:nvPr>
+        </p:nvCxnSpPr>
+        <p:spPr>
+          <a:xfrm>
+            <a:off x="6096000" y="1436050"/>
+            <a:ext cx="0" cy="1645920"/>
+          </a:xfrm>
+          <a:prstGeom prst="line">
+            <a:avLst/>
+          </a:prstGeom>
+          <a:ln w="19050">
+            <a:solidFill>
+              <a:srgbClr val="465359"/>
+            </a:solidFill>
+          </a:ln>
+        </p:spPr>
+        <p:style>
+          <a:lnRef idx="1">
+            <a:schemeClr val="accent1"/>
+          </a:lnRef>
+          <a:fillRef idx="0">
+            <a:schemeClr val="accent1"/>
+          </a:fillRef>
+          <a:effectRef idx="0">
+            <a:schemeClr val="accent1"/>
+          </a:effectRef>
+          <a:fontRef idx="minor">
+            <a:schemeClr val="tx1"/>
+          </a:fontRef>
+        </p:style>
+      </p:cxnSp>
+      <p:pic>
+        <p:nvPicPr>
+          <p:cNvPr id="4" name="Picture 3" descr="A screenshot of a computer screen&#10;&#10;Description automatically generated">
+            <a:extLst>
+              <a:ext uri="{FF2B5EF4-FFF2-40B4-BE49-F238E27FC236}">
+                <a16:creationId xmlns:a16="http://schemas.microsoft.com/office/drawing/2014/main" id="{9F6FDBA7-DD80-4AE1-A1A7-04A2C90B3D26}"/>
+              </a:ext>
+            </a:extLst>
+          </p:cNvPr>
+          <p:cNvPicPr>
+            <a:picLocks noChangeAspect="1"/>
+          </p:cNvPicPr>
+          <p:nvPr/>
+        </p:nvPicPr>
+        <p:blipFill rotWithShape="1">
+          <a:blip r:embed="rId3"/>
+          <a:srcRect l="50000" b="5144"/>
+          <a:stretch/>
+        </p:blipFill>
+        <p:spPr>
+          <a:xfrm>
+            <a:off x="108207" y="534079"/>
+            <a:ext cx="5879586" cy="3151083"/>
+          </a:xfrm>
+          <a:prstGeom prst="rect">
+            <a:avLst/>
+          </a:prstGeom>
+        </p:spPr>
+      </p:pic>
+      <p:sp>
+        <p:nvSpPr>
+          <p:cNvPr id="14" name="Rectangle 13">
+            <a:extLst>
+              <a:ext uri="{FF2B5EF4-FFF2-40B4-BE49-F238E27FC236}">
+                <a16:creationId xmlns:a16="http://schemas.microsoft.com/office/drawing/2014/main" id="{36B822CC-7DA9-4417-AA94-64CEB676F0B8}"/>
+              </a:ext>
+              <a:ext uri="{C183D7F6-B498-43B3-948B-1728B52AA6E4}">
+                <adec:decorative xmlns:adec="http://schemas.microsoft.com/office/drawing/2017/decorative" val="1"/>
+              </a:ext>
+            </a:extLst>
+          </p:cNvPr>
+          <p:cNvSpPr>
+            <a:spLocks noGrp="1" noRot="1" noChangeAspect="1" noMove="1" noResize="1" noEditPoints="1" noAdjustHandles="1" noChangeArrowheads="1" noChangeShapeType="1" noTextEdit="1"/>
+          </p:cNvSpPr>
+          <p:nvPr>
+            <p:extLst>
+              <p:ext uri="{386F3935-93C4-4BCD-93E2-E3B085C9AB24}">
+                <p16:designElem xmlns:p16="http://schemas.microsoft.com/office/powerpoint/2015/main" val="1"/>
+              </p:ext>
+            </p:extLst>
+          </p:nvPr>
+        </p:nvSpPr>
+        <p:spPr>
+          <a:xfrm>
+            <a:off x="447234" y="4219240"/>
+            <a:ext cx="11301984" cy="94997"/>
+          </a:xfrm>
+          <a:prstGeom prst="rect">
+            <a:avLst/>
+          </a:prstGeom>
+          <a:solidFill>
+            <a:srgbClr val="465359"/>
+          </a:solidFill>
+          <a:ln>
+            <a:noFill/>
+          </a:ln>
+          <a:effectLst/>
+        </p:spPr>
+        <p:style>
+          <a:lnRef idx="1">
+            <a:schemeClr val="accent1"/>
+          </a:lnRef>
+          <a:fillRef idx="3">
+            <a:schemeClr val="accent1"/>
+          </a:fillRef>
+          <a:effectRef idx="2">
+            <a:schemeClr val="accent1"/>
+          </a:effectRef>
+          <a:fontRef idx="minor">
+            <a:schemeClr val="lt1"/>
+          </a:fontRef>
+        </p:style>
+      </p:sp>
+      <p:sp>
+        <p:nvSpPr>
+          <p:cNvPr id="16" name="Rectangle 15">
+            <a:extLst>
+              <a:ext uri="{FF2B5EF4-FFF2-40B4-BE49-F238E27FC236}">
+                <a16:creationId xmlns:a16="http://schemas.microsoft.com/office/drawing/2014/main" id="{AFA01E88-71CC-4FF3-9E81-51E0C32B45E4}"/>
+              </a:ext>
+              <a:ext uri="{C183D7F6-B498-43B3-948B-1728B52AA6E4}">
+                <adec:decorative xmlns:adec="http://schemas.microsoft.com/office/drawing/2017/decorative" val="1"/>
+              </a:ext>
+            </a:extLst>
+          </p:cNvPr>
+          <p:cNvSpPr>
+            <a:spLocks noGrp="1" noRot="1" noChangeAspect="1" noMove="1" noResize="1" noEditPoints="1" noAdjustHandles="1" noChangeArrowheads="1" noChangeShapeType="1" noTextEdit="1"/>
+          </p:cNvSpPr>
+          <p:nvPr>
+            <p:extLst>
+              <p:ext uri="{386F3935-93C4-4BCD-93E2-E3B085C9AB24}">
+                <p16:designElem xmlns:p16="http://schemas.microsoft.com/office/powerpoint/2015/main" val="1"/>
+              </p:ext>
+            </p:extLst>
+          </p:nvPr>
+        </p:nvSpPr>
+        <p:spPr>
+          <a:xfrm>
+            <a:off x="447234" y="4359623"/>
+            <a:ext cx="11303626" cy="2051143"/>
+          </a:xfrm>
+          <a:prstGeom prst="rect">
+            <a:avLst/>
+          </a:prstGeom>
+          <a:solidFill>
+            <a:srgbClr val="465359"/>
+          </a:solidFill>
+          <a:ln w="6350" cmpd="sng">
+            <a:noFill/>
+          </a:ln>
+          <a:effectLst/>
+        </p:spPr>
+        <p:style>
+          <a:lnRef idx="1">
+            <a:schemeClr val="accent1"/>
+          </a:lnRef>
+          <a:fillRef idx="3">
+            <a:schemeClr val="accent1"/>
+          </a:fillRef>
+          <a:effectRef idx="2">
+            <a:schemeClr val="accent1"/>
+          </a:effectRef>
+          <a:fontRef idx="minor">
+            <a:schemeClr val="lt1"/>
+          </a:fontRef>
+        </p:style>
+      </p:sp>
+      <p:sp>
+        <p:nvSpPr>
           <p:cNvPr id="2" name="Title 1">
             <a:extLst>
               <a:ext uri="{FF2B5EF4-FFF2-40B4-BE49-F238E27FC236}">
@@ -4139,13 +5787,24 @@
             <p:ph type="title"/>
           </p:nvPr>
         </p:nvSpPr>
-        <p:spPr/>
-        <p:txBody>
-          <a:bodyPr/>
+        <p:spPr>
+          <a:xfrm>
+            <a:off x="679600" y="4596992"/>
+            <a:ext cx="3353432" cy="1607013"/>
+          </a:xfrm>
+        </p:spPr>
+        <p:txBody>
+          <a:bodyPr anchor="ctr">
+            <a:normAutofit/>
+          </a:bodyPr>
           <a:lstStyle/>
           <a:p>
             <a:r>
-              <a:rPr lang="en-GB" dirty="0"/>
+              <a:rPr lang="en-GB">
+                <a:solidFill>
+                  <a:srgbClr val="FFFFFF"/>
+                </a:solidFill>
+              </a:rPr>
               <a:t>Object-orientated features</a:t>
             </a:r>
           </a:p>
@@ -4167,25 +5826,44 @@
             <p:ph idx="1"/>
           </p:nvPr>
         </p:nvSpPr>
-        <p:spPr/>
-        <p:txBody>
-          <a:bodyPr/>
+        <p:spPr>
+          <a:xfrm>
+            <a:off x="4271491" y="4596992"/>
+            <a:ext cx="7240909" cy="1607012"/>
+          </a:xfrm>
+        </p:spPr>
+        <p:txBody>
+          <a:bodyPr>
+            <a:normAutofit/>
+          </a:bodyPr>
           <a:lstStyle/>
           <a:p>
             <a:r>
-              <a:rPr lang="en-GB" dirty="0"/>
+              <a:rPr lang="en-GB" dirty="0">
+                <a:solidFill>
+                  <a:srgbClr val="FFFFFF"/>
+                </a:solidFill>
+              </a:rPr>
               <a:t>Class implementation</a:t>
             </a:r>
           </a:p>
           <a:p>
             <a:r>
-              <a:rPr lang="en-GB" dirty="0"/>
+              <a:rPr lang="en-GB" dirty="0">
+                <a:solidFill>
+                  <a:srgbClr val="FFFFFF"/>
+                </a:solidFill>
+              </a:rPr>
               <a:t>Object instantiations</a:t>
             </a:r>
           </a:p>
           <a:p>
             <a:r>
-              <a:rPr lang="en-GB" dirty="0"/>
+              <a:rPr lang="en-GB" dirty="0">
+                <a:solidFill>
+                  <a:srgbClr val="FFFFFF"/>
+                </a:solidFill>
+              </a:rPr>
               <a:t>Method calls</a:t>
             </a:r>
           </a:p>
@@ -4204,7 +5882,7 @@
 </p:sld>
 </file>
 
-<file path=ppt/slides/slide4.xml><?xml version="1.0" encoding="utf-8"?>
+<file path=ppt/slides/slide7.xml><?xml version="1.0" encoding="utf-8"?>
 <p:sld xmlns:a="http://schemas.openxmlformats.org/drawingml/2006/main" xmlns:r="http://schemas.openxmlformats.org/officeDocument/2006/relationships" xmlns:p="http://schemas.openxmlformats.org/presentationml/2006/main">
   <p:cSld>
     <p:spTree>

</xml_diff>